<commit_message>
update slide years / index
</commit_message>
<xml_diff>
--- a/LectureSlides/03Parsing.pptx
+++ b/LectureSlides/03Parsing.pptx
@@ -404,7 +404,7 @@
           <a:p>
             <a:fld id="{DF0DA02A-3D36-4521-B995-F6A931B35345}" type="datetimeFigureOut">
               <a:rPr lang="en-US" smtClean="0"/>
-              <a:t>9/13/2023</a:t>
+              <a:t>10/14/2024</a:t>
             </a:fld>
             <a:endParaRPr lang="en-US"/>
           </a:p>
@@ -612,7 +612,7 @@
           <a:p>
             <a:fld id="{DF0DA02A-3D36-4521-B995-F6A931B35345}" type="datetimeFigureOut">
               <a:rPr lang="en-US" smtClean="0"/>
-              <a:t>9/13/2023</a:t>
+              <a:t>10/14/2024</a:t>
             </a:fld>
             <a:endParaRPr lang="en-US"/>
           </a:p>
@@ -868,7 +868,7 @@
           <a:p>
             <a:fld id="{DF0DA02A-3D36-4521-B995-F6A931B35345}" type="datetimeFigureOut">
               <a:rPr lang="en-US" smtClean="0"/>
-              <a:t>9/13/2023</a:t>
+              <a:t>10/14/2024</a:t>
             </a:fld>
             <a:endParaRPr lang="en-US"/>
           </a:p>
@@ -1053,7 +1053,7 @@
           <a:p>
             <a:fld id="{DF0DA02A-3D36-4521-B995-F6A931B35345}" type="datetimeFigureOut">
               <a:rPr lang="en-US" smtClean="0"/>
-              <a:t>9/13/2023</a:t>
+              <a:t>10/14/2024</a:t>
             </a:fld>
             <a:endParaRPr lang="en-US"/>
           </a:p>
@@ -1396,7 +1396,7 @@
           <a:p>
             <a:fld id="{DF0DA02A-3D36-4521-B995-F6A931B35345}" type="datetimeFigureOut">
               <a:rPr lang="en-US" smtClean="0"/>
-              <a:t>9/13/2023</a:t>
+              <a:t>10/14/2024</a:t>
             </a:fld>
             <a:endParaRPr lang="en-US"/>
           </a:p>
@@ -1701,7 +1701,7 @@
           <a:p>
             <a:fld id="{DF0DA02A-3D36-4521-B995-F6A931B35345}" type="datetimeFigureOut">
               <a:rPr lang="en-US" smtClean="0"/>
-              <a:t>9/13/2023</a:t>
+              <a:t>10/14/2024</a:t>
             </a:fld>
             <a:endParaRPr lang="en-US"/>
           </a:p>
@@ -2110,7 +2110,7 @@
           <a:p>
             <a:fld id="{DF0DA02A-3D36-4521-B995-F6A931B35345}" type="datetimeFigureOut">
               <a:rPr lang="en-US" smtClean="0"/>
-              <a:t>9/13/2023</a:t>
+              <a:t>10/14/2024</a:t>
             </a:fld>
             <a:endParaRPr lang="en-US"/>
           </a:p>
@@ -2228,7 +2228,7 @@
           <a:p>
             <a:fld id="{DF0DA02A-3D36-4521-B995-F6A931B35345}" type="datetimeFigureOut">
               <a:rPr lang="en-US" smtClean="0"/>
-              <a:t>9/13/2023</a:t>
+              <a:t>10/14/2024</a:t>
             </a:fld>
             <a:endParaRPr lang="en-US"/>
           </a:p>
@@ -2399,7 +2399,7 @@
           <a:p>
             <a:fld id="{DF0DA02A-3D36-4521-B995-F6A931B35345}" type="datetimeFigureOut">
               <a:rPr lang="en-US" smtClean="0"/>
-              <a:t>9/13/2023</a:t>
+              <a:t>10/14/2024</a:t>
             </a:fld>
             <a:endParaRPr lang="en-US"/>
           </a:p>
@@ -2768,7 +2768,7 @@
           <a:p>
             <a:fld id="{DF0DA02A-3D36-4521-B995-F6A931B35345}" type="datetimeFigureOut">
               <a:rPr lang="en-US" smtClean="0"/>
-              <a:t>9/13/2023</a:t>
+              <a:t>10/14/2024</a:t>
             </a:fld>
             <a:endParaRPr lang="en-US"/>
           </a:p>
@@ -3145,7 +3145,7 @@
           <a:p>
             <a:fld id="{DF0DA02A-3D36-4521-B995-F6A931B35345}" type="datetimeFigureOut">
               <a:rPr lang="en-US" smtClean="0"/>
-              <a:t>9/13/2023</a:t>
+              <a:t>10/14/2024</a:t>
             </a:fld>
             <a:endParaRPr lang="en-US"/>
           </a:p>
@@ -3432,7 +3432,7 @@
           <a:p>
             <a:fld id="{DF0DA02A-3D36-4521-B995-F6A931B35345}" type="datetimeFigureOut">
               <a:rPr lang="en-US" smtClean="0"/>
-              <a:t>9/13/2023</a:t>
+              <a:t>10/14/2024</a:t>
             </a:fld>
             <a:endParaRPr lang="en-US"/>
           </a:p>
@@ -4007,15 +4007,23 @@
           <a:p>
             <a:r>
               <a:rPr lang="en-US" dirty="0"/>
-              <a:t>Slides  ©2023 Rose </a:t>
+              <a:t>Slides  </a:t>
+            </a:r>
+            <a:r>
+              <a:rPr lang="en-US"/>
+              <a:t>©2024 </a:t>
+            </a:r>
+            <a:r>
+              <a:rPr lang="en-US" dirty="0"/>
+              <a:t>Rose </a:t>
             </a:r>
             <a:r>
               <a:rPr lang="en-US" dirty="0" err="1"/>
-              <a:t>bohrer</a:t>
-            </a:r>
-            <a:r>
-              <a:rPr lang="en-US" dirty="0"/>
-              <a:t>, used for cs 4536/536 at </a:t>
+              <a:t>bohrer,</a:t>
+            </a:r>
+            <a:r>
+              <a:rPr lang="en-US" dirty="0"/>
+              <a:t> used for cs 4536/536 at </a:t>
             </a:r>
             <a:r>
               <a:rPr lang="en-US" dirty="0" err="1"/>

</xml_diff>